<commit_message>
Update Finance Incentive Program.pptx
</commit_message>
<xml_diff>
--- a/Business/Charlie Personal Archives/Presentation/Finance Incentive Program.pptx
+++ b/Business/Charlie Personal Archives/Presentation/Finance Incentive Program.pptx
@@ -5,7 +5,7 @@
     <p:sldMasterId id="2147483768" r:id="rId1"/>
   </p:sldMasterIdLst>
   <p:notesMasterIdLst>
-    <p:notesMasterId r:id="rId9"/>
+    <p:notesMasterId r:id="rId10"/>
   </p:notesMasterIdLst>
   <p:sldIdLst>
     <p:sldId id="257" r:id="rId2"/>
@@ -15,6 +15,7 @@
     <p:sldId id="261" r:id="rId6"/>
     <p:sldId id="262" r:id="rId7"/>
     <p:sldId id="263" r:id="rId8"/>
+    <p:sldId id="264" r:id="rId9"/>
   </p:sldIdLst>
   <p:sldSz cx="12192000" cy="6858000"/>
   <p:notesSz cx="6858000" cy="9144000"/>
@@ -7654,7 +7655,39 @@
                   </a:outerShdw>
                 </a:effectLst>
               </a:rPr>
-              <a:t>Level 1 - $2,500 Total</a:t>
+              <a:t>Level 1 - </a:t>
+            </a:r>
+            <a:r>
+              <a:rPr lang="en-US" sz="5400" dirty="0" smtClean="0">
+                <a:ln w="0"/>
+                <a:solidFill>
+                  <a:schemeClr val="accent1"/>
+                </a:solidFill>
+                <a:effectLst>
+                  <a:outerShdw blurRad="38100" dist="25400" dir="5400000" algn="ctr" rotWithShape="0">
+                    <a:srgbClr val="6E747A">
+                      <a:alpha val="43000"/>
+                    </a:srgbClr>
+                  </a:outerShdw>
+                </a:effectLst>
+              </a:rPr>
+              <a:t>$3,000 </a:t>
+            </a:r>
+            <a:r>
+              <a:rPr lang="en-US" sz="5400" dirty="0" smtClean="0">
+                <a:ln w="0"/>
+                <a:solidFill>
+                  <a:schemeClr val="accent1"/>
+                </a:solidFill>
+                <a:effectLst>
+                  <a:outerShdw blurRad="38100" dist="25400" dir="5400000" algn="ctr" rotWithShape="0">
+                    <a:srgbClr val="6E747A">
+                      <a:alpha val="43000"/>
+                    </a:srgbClr>
+                  </a:outerShdw>
+                </a:effectLst>
+              </a:rPr>
+              <a:t>Total</a:t>
             </a:r>
             <a:endParaRPr lang="en-US" sz="5400" b="0" cap="none" spc="0" dirty="0">
               <a:ln w="0"/>
@@ -8105,7 +8138,39 @@
                   </a:outerShdw>
                 </a:effectLst>
               </a:rPr>
-              <a:t>Level 2 - $5,000 Total</a:t>
+              <a:t>Level 2 - </a:t>
+            </a:r>
+            <a:r>
+              <a:rPr lang="en-US" sz="5400" dirty="0" smtClean="0">
+                <a:ln w="0"/>
+                <a:solidFill>
+                  <a:schemeClr val="accent1"/>
+                </a:solidFill>
+                <a:effectLst>
+                  <a:outerShdw blurRad="38100" dist="25400" dir="5400000" algn="ctr" rotWithShape="0">
+                    <a:srgbClr val="6E747A">
+                      <a:alpha val="43000"/>
+                    </a:srgbClr>
+                  </a:outerShdw>
+                </a:effectLst>
+              </a:rPr>
+              <a:t>$6,000 </a:t>
+            </a:r>
+            <a:r>
+              <a:rPr lang="en-US" sz="5400" dirty="0" smtClean="0">
+                <a:ln w="0"/>
+                <a:solidFill>
+                  <a:schemeClr val="accent1"/>
+                </a:solidFill>
+                <a:effectLst>
+                  <a:outerShdw blurRad="38100" dist="25400" dir="5400000" algn="ctr" rotWithShape="0">
+                    <a:srgbClr val="6E747A">
+                      <a:alpha val="43000"/>
+                    </a:srgbClr>
+                  </a:outerShdw>
+                </a:effectLst>
+              </a:rPr>
+              <a:t>Total</a:t>
             </a:r>
             <a:endParaRPr lang="en-US" sz="5400" b="0" cap="none" spc="0" dirty="0">
               <a:ln w="0"/>
@@ -8541,7 +8606,7 @@
         <p:spPr>
           <a:xfrm>
             <a:off x="341686" y="420496"/>
-            <a:ext cx="6481145" cy="923330"/>
+            <a:ext cx="7035060" cy="923330"/>
           </a:xfrm>
           <a:prstGeom prst="rect">
             <a:avLst/>
@@ -8568,7 +8633,39 @@
                   </a:outerShdw>
                 </a:effectLst>
               </a:rPr>
-              <a:t>Level 3 - $7,500 Total</a:t>
+              <a:t>Level 3 - </a:t>
+            </a:r>
+            <a:r>
+              <a:rPr lang="en-US" sz="5400" dirty="0" smtClean="0">
+                <a:ln w="0"/>
+                <a:solidFill>
+                  <a:schemeClr val="accent1"/>
+                </a:solidFill>
+                <a:effectLst>
+                  <a:outerShdw blurRad="38100" dist="25400" dir="5400000" algn="ctr" rotWithShape="0">
+                    <a:srgbClr val="6E747A">
+                      <a:alpha val="43000"/>
+                    </a:srgbClr>
+                  </a:outerShdw>
+                </a:effectLst>
+              </a:rPr>
+              <a:t>$9,000 </a:t>
+            </a:r>
+            <a:r>
+              <a:rPr lang="en-US" sz="5400" dirty="0" smtClean="0">
+                <a:ln w="0"/>
+                <a:solidFill>
+                  <a:schemeClr val="accent1"/>
+                </a:solidFill>
+                <a:effectLst>
+                  <a:outerShdw blurRad="38100" dist="25400" dir="5400000" algn="ctr" rotWithShape="0">
+                    <a:srgbClr val="6E747A">
+                      <a:alpha val="43000"/>
+                    </a:srgbClr>
+                  </a:outerShdw>
+                </a:effectLst>
+              </a:rPr>
+              <a:t>Total</a:t>
             </a:r>
             <a:endParaRPr lang="en-US" sz="5400" b="0" cap="none" spc="0" dirty="0">
               <a:ln w="0"/>
@@ -9052,7 +9149,39 @@
                   </a:outerShdw>
                 </a:effectLst>
               </a:rPr>
-              <a:t>Level 4 - $10,000 Total</a:t>
+              <a:t>Level 4 - $</a:t>
+            </a:r>
+            <a:r>
+              <a:rPr lang="en-US" sz="5400" dirty="0" smtClean="0">
+                <a:ln w="0"/>
+                <a:solidFill>
+                  <a:schemeClr val="accent1"/>
+                </a:solidFill>
+                <a:effectLst>
+                  <a:outerShdw blurRad="38100" dist="25400" dir="5400000" algn="ctr" rotWithShape="0">
+                    <a:srgbClr val="6E747A">
+                      <a:alpha val="43000"/>
+                    </a:srgbClr>
+                  </a:outerShdw>
+                </a:effectLst>
+              </a:rPr>
+              <a:t>12,000 </a:t>
+            </a:r>
+            <a:r>
+              <a:rPr lang="en-US" sz="5400" dirty="0" smtClean="0">
+                <a:ln w="0"/>
+                <a:solidFill>
+                  <a:schemeClr val="accent1"/>
+                </a:solidFill>
+                <a:effectLst>
+                  <a:outerShdw blurRad="38100" dist="25400" dir="5400000" algn="ctr" rotWithShape="0">
+                    <a:srgbClr val="6E747A">
+                      <a:alpha val="43000"/>
+                    </a:srgbClr>
+                  </a:outerShdw>
+                </a:effectLst>
+              </a:rPr>
+              <a:t>Total</a:t>
             </a:r>
             <a:endParaRPr lang="en-US" sz="5400" b="0" cap="none" spc="0" dirty="0">
               <a:ln w="0"/>
@@ -9103,7 +9232,6 @@
               <a:rPr lang="en-US" sz="4000" dirty="0"/>
               <a:t>back or ankle)</a:t>
             </a:r>
-            <a:endParaRPr lang="en-US" sz="4000" dirty="0"/>
           </a:p>
         </p:txBody>
       </p:sp>
@@ -9511,7 +9639,39 @@
                   </a:outerShdw>
                 </a:effectLst>
               </a:rPr>
-              <a:t>Level 5 - $15,000 Total</a:t>
+              <a:t>Level 5 - $</a:t>
+            </a:r>
+            <a:r>
+              <a:rPr lang="en-US" sz="5400" dirty="0" smtClean="0">
+                <a:ln w="0"/>
+                <a:solidFill>
+                  <a:schemeClr val="accent1"/>
+                </a:solidFill>
+                <a:effectLst>
+                  <a:outerShdw blurRad="38100" dist="25400" dir="5400000" algn="ctr" rotWithShape="0">
+                    <a:srgbClr val="6E747A">
+                      <a:alpha val="43000"/>
+                    </a:srgbClr>
+                  </a:outerShdw>
+                </a:effectLst>
+              </a:rPr>
+              <a:t>18,500 </a:t>
+            </a:r>
+            <a:r>
+              <a:rPr lang="en-US" sz="5400" dirty="0" smtClean="0">
+                <a:ln w="0"/>
+                <a:solidFill>
+                  <a:schemeClr val="accent1"/>
+                </a:solidFill>
+                <a:effectLst>
+                  <a:outerShdw blurRad="38100" dist="25400" dir="5400000" algn="ctr" rotWithShape="0">
+                    <a:srgbClr val="6E747A">
+                      <a:alpha val="43000"/>
+                    </a:srgbClr>
+                  </a:outerShdw>
+                </a:effectLst>
+              </a:rPr>
+              <a:t>Total</a:t>
             </a:r>
             <a:endParaRPr lang="en-US" sz="5400" b="0" cap="none" spc="0" dirty="0">
               <a:ln w="0"/>
@@ -9605,6 +9765,163 @@
       </p:par>
     </p:tnLst>
   </p:timing>
+</p:sld>
+</file>
+
+<file path=ppt/slides/slide8.xml><?xml version="1.0" encoding="utf-8"?>
+<p:sld xmlns:a="http://schemas.openxmlformats.org/drawingml/2006/main" xmlns:r="http://schemas.openxmlformats.org/officeDocument/2006/relationships" xmlns:p="http://schemas.openxmlformats.org/presentationml/2006/main">
+  <p:cSld>
+    <p:spTree>
+      <p:nvGrpSpPr>
+        <p:cNvPr id="1" name=""/>
+        <p:cNvGrpSpPr/>
+        <p:nvPr/>
+      </p:nvGrpSpPr>
+      <p:grpSpPr>
+        <a:xfrm>
+          <a:off x="0" y="0"/>
+          <a:ext cx="0" cy="0"/>
+          <a:chOff x="0" y="0"/>
+          <a:chExt cx="0" cy="0"/>
+        </a:xfrm>
+      </p:grpSpPr>
+      <p:sp>
+        <p:nvSpPr>
+          <p:cNvPr id="2" name="Title 1"/>
+          <p:cNvSpPr>
+            <a:spLocks noGrp="1"/>
+          </p:cNvSpPr>
+          <p:nvPr>
+            <p:ph type="title"/>
+          </p:nvPr>
+        </p:nvSpPr>
+        <p:spPr/>
+        <p:txBody>
+          <a:bodyPr/>
+          <a:lstStyle/>
+          <a:p>
+            <a:r>
+              <a:rPr lang="en-US" dirty="0" smtClean="0"/>
+              <a:t>The Richest Engineer</a:t>
+            </a:r>
+            <a:endParaRPr lang="en-US" dirty="0"/>
+          </a:p>
+        </p:txBody>
+      </p:sp>
+      <p:sp>
+        <p:nvSpPr>
+          <p:cNvPr id="3" name="Content Placeholder 2"/>
+          <p:cNvSpPr>
+            <a:spLocks noGrp="1"/>
+          </p:cNvSpPr>
+          <p:nvPr>
+            <p:ph idx="1"/>
+          </p:nvPr>
+        </p:nvSpPr>
+        <p:spPr>
+          <a:xfrm>
+            <a:off x="913795" y="1732450"/>
+            <a:ext cx="10353762" cy="2355974"/>
+          </a:xfrm>
+        </p:spPr>
+        <p:txBody>
+          <a:bodyPr/>
+          <a:lstStyle/>
+          <a:p>
+            <a:pPr marL="36900" indent="0">
+              <a:buNone/>
+            </a:pPr>
+            <a:r>
+              <a:rPr lang="en-US" dirty="0" smtClean="0"/>
+              <a:t>Whoever raises the most money receives:</a:t>
+            </a:r>
+          </a:p>
+          <a:p>
+            <a:pPr marL="494100" indent="-457200">
+              <a:buFont typeface="+mj-lt"/>
+              <a:buAutoNum type="arabicPeriod"/>
+            </a:pPr>
+            <a:r>
+              <a:rPr lang="en-US" dirty="0"/>
+              <a:t>All expenses paid to SpaceVision from UNH SEDS </a:t>
+            </a:r>
+            <a:r>
+              <a:rPr lang="en-US" dirty="0" err="1"/>
+              <a:t>fo</a:t>
+            </a:r>
+            <a:r>
+              <a:rPr lang="en-US" dirty="0"/>
+              <a:t> </a:t>
+            </a:r>
+            <a:r>
+              <a:rPr lang="en-US" dirty="0" err="1" smtClean="0"/>
+              <a:t>sho</a:t>
+            </a:r>
+            <a:endParaRPr lang="en-US" dirty="0" smtClean="0"/>
+          </a:p>
+          <a:p>
+            <a:pPr marL="494100" indent="-457200">
+              <a:buFont typeface="+mj-lt"/>
+              <a:buAutoNum type="arabicPeriod"/>
+            </a:pPr>
+            <a:r>
+              <a:rPr lang="en-US" dirty="0" smtClean="0"/>
+              <a:t>If </a:t>
+            </a:r>
+            <a:r>
+              <a:rPr lang="en-US" dirty="0"/>
+              <a:t>21 - all expenses paid bar night from </a:t>
+            </a:r>
+            <a:r>
+              <a:rPr lang="en-US" dirty="0" smtClean="0"/>
+              <a:t>Charlie</a:t>
+            </a:r>
+            <a:br>
+              <a:rPr lang="en-US" dirty="0" smtClean="0"/>
+            </a:br>
+            <a:r>
+              <a:rPr lang="en-US" dirty="0" smtClean="0"/>
+              <a:t>If </a:t>
+            </a:r>
+            <a:r>
+              <a:rPr lang="en-US" dirty="0"/>
+              <a:t>not - I will buy liquor for you up to 30 </a:t>
+            </a:r>
+            <a:r>
+              <a:rPr lang="en-US" dirty="0" smtClean="0"/>
+              <a:t>bucks</a:t>
+            </a:r>
+          </a:p>
+          <a:p>
+            <a:pPr marL="494100" indent="-457200">
+              <a:buFont typeface="+mj-lt"/>
+              <a:buAutoNum type="arabicPeriod"/>
+            </a:pPr>
+            <a:r>
+              <a:rPr lang="en-US" dirty="0" smtClean="0"/>
+              <a:t>I </a:t>
+            </a:r>
+            <a:r>
+              <a:rPr lang="en-US" dirty="0"/>
+              <a:t>will remember what you did and will owe you one (1 Nitschelm buck</a:t>
+            </a:r>
+            <a:r>
+              <a:rPr lang="en-US" dirty="0" smtClean="0"/>
+              <a:t>)</a:t>
+            </a:r>
+          </a:p>
+        </p:txBody>
+      </p:sp>
+    </p:spTree>
+    <p:extLst>
+      <p:ext uri="{BB962C8B-B14F-4D97-AF65-F5344CB8AC3E}">
+        <p14:creationId xmlns:p14="http://schemas.microsoft.com/office/powerpoint/2010/main" val="1468827568"/>
+      </p:ext>
+    </p:extLst>
+  </p:cSld>
+  <p:clrMapOvr>
+    <a:masterClrMapping/>
+  </p:clrMapOvr>
 </p:sld>
 </file>
 

</xml_diff>